<commit_message>
Actualizacion de los links de clase
</commit_message>
<xml_diff>
--- a/Semana2 - Intro_obj_condicionales/Clase03/Clase-03-Condicionales.pptx
+++ b/Semana2 - Intro_obj_condicionales/Clase03/Clase-03-Condicionales.pptx
@@ -232,7 +232,7 @@
           <a:p>
             <a:fld id="{522057E8-DCE3-42A0-A625-E25CA1AC41D9}" type="datetimeFigureOut">
               <a:rPr lang="en-US" smtClean="0"/>
-              <a:t>1/19/2022</a:t>
+              <a:t>2/7/2022</a:t>
             </a:fld>
             <a:endParaRPr lang="en-US"/>
           </a:p>
@@ -14744,6 +14744,50 @@
           </a:fontRef>
         </p:style>
       </p:cxnSp>
+      <p:sp>
+        <p:nvSpPr>
+          <p:cNvPr id="12" name="CuadroTexto 11">
+            <a:extLst>
+              <a:ext uri="{FF2B5EF4-FFF2-40B4-BE49-F238E27FC236}">
+                <a16:creationId xmlns:a16="http://schemas.microsoft.com/office/drawing/2014/main" id="{0B0B0BF4-4737-4E57-B688-4997E8F53295}"/>
+              </a:ext>
+            </a:extLst>
+          </p:cNvPr>
+          <p:cNvSpPr txBox="1"/>
+          <p:nvPr/>
+        </p:nvSpPr>
+        <p:spPr>
+          <a:xfrm>
+            <a:off x="8675788" y="296210"/>
+            <a:ext cx="3154296" cy="1723549"/>
+          </a:xfrm>
+          <a:prstGeom prst="rect">
+            <a:avLst/>
+          </a:prstGeom>
+          <a:noFill/>
+        </p:spPr>
+        <p:txBody>
+          <a:bodyPr wrap="square">
+            <a:spAutoFit/>
+          </a:bodyPr>
+          <a:lstStyle/>
+          <a:p>
+            <a:r>
+              <a:rPr lang="es-CO" sz="1400" dirty="0">
+                <a:hlinkClick r:id="rId3"/>
+              </a:rPr>
+              <a:t>https://github.com/urregozw/ST0242-2022-Juan_Luis/blob/main/Semana2%20-%20Intro_obj_condicionales/Clase03/E01_12.java</a:t>
+            </a:r>
+            <a:endParaRPr lang="es-CO" sz="1400" dirty="0"/>
+          </a:p>
+          <a:p>
+            <a:endParaRPr lang="es-CO" dirty="0"/>
+          </a:p>
+          <a:p>
+            <a:endParaRPr lang="es-CO" dirty="0"/>
+          </a:p>
+        </p:txBody>
+      </p:sp>
     </p:spTree>
     <p:extLst>
       <p:ext uri="{BB962C8B-B14F-4D97-AF65-F5344CB8AC3E}">
@@ -15587,6 +15631,47 @@
           </a:fontRef>
         </p:style>
       </p:pic>
+      <p:sp>
+        <p:nvSpPr>
+          <p:cNvPr id="6" name="CuadroTexto 5">
+            <a:extLst>
+              <a:ext uri="{FF2B5EF4-FFF2-40B4-BE49-F238E27FC236}">
+                <a16:creationId xmlns:a16="http://schemas.microsoft.com/office/drawing/2014/main" id="{BE7F9E08-8665-428D-9098-F715A00AFA10}"/>
+              </a:ext>
+            </a:extLst>
+          </p:cNvPr>
+          <p:cNvSpPr txBox="1"/>
+          <p:nvPr/>
+        </p:nvSpPr>
+        <p:spPr>
+          <a:xfrm>
+            <a:off x="4278013" y="5892710"/>
+            <a:ext cx="6104238" cy="1200329"/>
+          </a:xfrm>
+          <a:prstGeom prst="rect">
+            <a:avLst/>
+          </a:prstGeom>
+          <a:noFill/>
+        </p:spPr>
+        <p:txBody>
+          <a:bodyPr wrap="square">
+            <a:spAutoFit/>
+          </a:bodyPr>
+          <a:lstStyle/>
+          <a:p>
+            <a:r>
+              <a:rPr lang="es-CO" dirty="0">
+                <a:hlinkClick r:id="rId3"/>
+              </a:rPr>
+              <a:t>https://github.com/urregozw/ST0242-2022-Juan_Luis/blob/main/Semana2%20-%20Intro_obj_condicionales/Clase03/E02_15.java</a:t>
+            </a:r>
+            <a:endParaRPr lang="es-CO" dirty="0"/>
+          </a:p>
+          <a:p>
+            <a:endParaRPr lang="es-CO" dirty="0"/>
+          </a:p>
+        </p:txBody>
+      </p:sp>
     </p:spTree>
     <p:extLst>
       <p:ext uri="{BB962C8B-B14F-4D97-AF65-F5344CB8AC3E}">
@@ -17470,6 +17555,47 @@
               </a:rPr>
               <a:t>Codifique el siguiente programa</a:t>
             </a:r>
+          </a:p>
+        </p:txBody>
+      </p:sp>
+      <p:sp>
+        <p:nvSpPr>
+          <p:cNvPr id="13" name="CuadroTexto 12">
+            <a:extLst>
+              <a:ext uri="{FF2B5EF4-FFF2-40B4-BE49-F238E27FC236}">
+                <a16:creationId xmlns:a16="http://schemas.microsoft.com/office/drawing/2014/main" id="{0EF4D19A-7731-46EC-9A14-C02BA8EB7C3F}"/>
+              </a:ext>
+            </a:extLst>
+          </p:cNvPr>
+          <p:cNvSpPr txBox="1"/>
+          <p:nvPr/>
+        </p:nvSpPr>
+        <p:spPr>
+          <a:xfrm>
+            <a:off x="8678535" y="100236"/>
+            <a:ext cx="3373373" cy="1600438"/>
+          </a:xfrm>
+          <a:prstGeom prst="rect">
+            <a:avLst/>
+          </a:prstGeom>
+          <a:noFill/>
+        </p:spPr>
+        <p:txBody>
+          <a:bodyPr wrap="square">
+            <a:spAutoFit/>
+          </a:bodyPr>
+          <a:lstStyle/>
+          <a:p>
+            <a:r>
+              <a:rPr lang="es-CO" sz="1600" dirty="0">
+                <a:hlinkClick r:id="rId3"/>
+              </a:rPr>
+              <a:t>https://github.com/urregozw/ST0242-2022-Juan_Luis/blob/main/Semana2%20-%20Intro_obj_condicionales/Clase03/E03_19.java</a:t>
+            </a:r>
+            <a:endParaRPr lang="es-CO" sz="1600" dirty="0"/>
+          </a:p>
+          <a:p>
+            <a:endParaRPr lang="es-CO" sz="1600" dirty="0"/>
           </a:p>
         </p:txBody>
       </p:sp>
@@ -18871,6 +18997,47 @@
           </a:fontRef>
         </p:style>
       </p:pic>
+      <p:sp>
+        <p:nvSpPr>
+          <p:cNvPr id="7" name="CuadroTexto 6">
+            <a:extLst>
+              <a:ext uri="{FF2B5EF4-FFF2-40B4-BE49-F238E27FC236}">
+                <a16:creationId xmlns:a16="http://schemas.microsoft.com/office/drawing/2014/main" id="{B8CF0864-EFC7-4686-8E66-4930CE353050}"/>
+              </a:ext>
+            </a:extLst>
+          </p:cNvPr>
+          <p:cNvSpPr txBox="1"/>
+          <p:nvPr/>
+        </p:nvSpPr>
+        <p:spPr>
+          <a:xfrm>
+            <a:off x="9510584" y="80640"/>
+            <a:ext cx="2681416" cy="2031325"/>
+          </a:xfrm>
+          <a:prstGeom prst="rect">
+            <a:avLst/>
+          </a:prstGeom>
+          <a:noFill/>
+        </p:spPr>
+        <p:txBody>
+          <a:bodyPr wrap="square">
+            <a:spAutoFit/>
+          </a:bodyPr>
+          <a:lstStyle/>
+          <a:p>
+            <a:r>
+              <a:rPr lang="es-CO" dirty="0">
+                <a:hlinkClick r:id="rId4"/>
+              </a:rPr>
+              <a:t>https://github.com/urregozw/ST0242-2022-Juan_Luis/blob/main/Semana2%20-%20Intro_obj_condicionales/Clase03/E04_21.java</a:t>
+            </a:r>
+            <a:endParaRPr lang="es-CO" dirty="0"/>
+          </a:p>
+          <a:p>
+            <a:endParaRPr lang="es-CO" dirty="0"/>
+          </a:p>
+        </p:txBody>
+      </p:sp>
     </p:spTree>
     <p:extLst>
       <p:ext uri="{BB962C8B-B14F-4D97-AF65-F5344CB8AC3E}">
@@ -19827,6 +19994,47 @@
           </a:fontRef>
         </p:style>
       </p:pic>
+      <p:sp>
+        <p:nvSpPr>
+          <p:cNvPr id="7" name="CuadroTexto 6">
+            <a:extLst>
+              <a:ext uri="{FF2B5EF4-FFF2-40B4-BE49-F238E27FC236}">
+                <a16:creationId xmlns:a16="http://schemas.microsoft.com/office/drawing/2014/main" id="{B85E7A41-B7DE-4D9A-8079-066D889CC494}"/>
+              </a:ext>
+            </a:extLst>
+          </p:cNvPr>
+          <p:cNvSpPr txBox="1"/>
+          <p:nvPr/>
+        </p:nvSpPr>
+        <p:spPr>
+          <a:xfrm>
+            <a:off x="10123921" y="222069"/>
+            <a:ext cx="1989438" cy="2585323"/>
+          </a:xfrm>
+          <a:prstGeom prst="rect">
+            <a:avLst/>
+          </a:prstGeom>
+          <a:noFill/>
+        </p:spPr>
+        <p:txBody>
+          <a:bodyPr wrap="square">
+            <a:spAutoFit/>
+          </a:bodyPr>
+          <a:lstStyle/>
+          <a:p>
+            <a:r>
+              <a:rPr lang="es-CO" dirty="0">
+                <a:hlinkClick r:id="rId4"/>
+              </a:rPr>
+              <a:t>https://github.com/urregozw/ST0242-2022-Juan_Luis/blob/main/Semana2%20-%20Intro_obj_condicionales/Clase03/E05_24.java</a:t>
+            </a:r>
+            <a:endParaRPr lang="es-CO" dirty="0"/>
+          </a:p>
+          <a:p>
+            <a:endParaRPr lang="es-CO" dirty="0"/>
+          </a:p>
+        </p:txBody>
+      </p:sp>
     </p:spTree>
     <p:extLst>
       <p:ext uri="{BB962C8B-B14F-4D97-AF65-F5344CB8AC3E}">
@@ -20733,6 +20941,47 @@
           </a:fontRef>
         </p:style>
       </p:pic>
+      <p:sp>
+        <p:nvSpPr>
+          <p:cNvPr id="7" name="CuadroTexto 6">
+            <a:extLst>
+              <a:ext uri="{FF2B5EF4-FFF2-40B4-BE49-F238E27FC236}">
+                <a16:creationId xmlns:a16="http://schemas.microsoft.com/office/drawing/2014/main" id="{89EE2F6E-5E12-4914-8165-261668664C37}"/>
+              </a:ext>
+            </a:extLst>
+          </p:cNvPr>
+          <p:cNvSpPr txBox="1"/>
+          <p:nvPr/>
+        </p:nvSpPr>
+        <p:spPr>
+          <a:xfrm>
+            <a:off x="10103708" y="63415"/>
+            <a:ext cx="2088292" cy="2585323"/>
+          </a:xfrm>
+          <a:prstGeom prst="rect">
+            <a:avLst/>
+          </a:prstGeom>
+          <a:noFill/>
+        </p:spPr>
+        <p:txBody>
+          <a:bodyPr wrap="square">
+            <a:spAutoFit/>
+          </a:bodyPr>
+          <a:lstStyle/>
+          <a:p>
+            <a:r>
+              <a:rPr lang="es-CO" dirty="0">
+                <a:hlinkClick r:id="rId3"/>
+              </a:rPr>
+              <a:t>https://github.com/urregozw/ST0242-2022-Juan_Luis/blob/main/Semana2%20-%20Intro_obj_condicionales/Clase03/E06_27.java</a:t>
+            </a:r>
+            <a:endParaRPr lang="es-CO" dirty="0"/>
+          </a:p>
+          <a:p>
+            <a:endParaRPr lang="es-CO" dirty="0"/>
+          </a:p>
+        </p:txBody>
+      </p:sp>
     </p:spTree>
     <p:extLst>
       <p:ext uri="{BB962C8B-B14F-4D97-AF65-F5344CB8AC3E}">
@@ -23755,6 +24004,47 @@
               </a:rPr>
               <a:t>1</a:t>
             </a:r>
+          </a:p>
+        </p:txBody>
+      </p:sp>
+      <p:sp>
+        <p:nvSpPr>
+          <p:cNvPr id="8" name="CuadroTexto 7">
+            <a:extLst>
+              <a:ext uri="{FF2B5EF4-FFF2-40B4-BE49-F238E27FC236}">
+                <a16:creationId xmlns:a16="http://schemas.microsoft.com/office/drawing/2014/main" id="{2CE8C5D6-A671-40F9-8F64-A31C6B997C2C}"/>
+              </a:ext>
+            </a:extLst>
+          </p:cNvPr>
+          <p:cNvSpPr txBox="1"/>
+          <p:nvPr/>
+        </p:nvSpPr>
+        <p:spPr>
+          <a:xfrm>
+            <a:off x="9544807" y="222069"/>
+            <a:ext cx="2261286" cy="1600438"/>
+          </a:xfrm>
+          <a:prstGeom prst="rect">
+            <a:avLst/>
+          </a:prstGeom>
+          <a:noFill/>
+        </p:spPr>
+        <p:txBody>
+          <a:bodyPr wrap="square">
+            <a:spAutoFit/>
+          </a:bodyPr>
+          <a:lstStyle/>
+          <a:p>
+            <a:r>
+              <a:rPr lang="es-CO" sz="1400" dirty="0">
+                <a:hlinkClick r:id="rId3"/>
+              </a:rPr>
+              <a:t>https://github.com/urregozw/ST0242-2022-Juan_Luis/blob/main/Semana2%20-%20Intro_obj_condicionales/Clase03/E07_33.java</a:t>
+            </a:r>
+            <a:endParaRPr lang="es-CO" sz="1400" dirty="0"/>
+          </a:p>
+          <a:p>
+            <a:endParaRPr lang="es-CO" sz="1400" dirty="0"/>
           </a:p>
         </p:txBody>
       </p:sp>

</xml_diff>